<commit_message>
Start update to dialogs library topic for R9.
</commit_message>
<xml_diff>
--- a/art-source/power-point/bot-concepts-art.pptx
+++ b/art-source/power-point/bot-concepts-art.pptx
@@ -272,7 +272,7 @@
           <a:p>
             <a:fld id="{D5D811E7-D537-4010-8288-CC65B28B2855}" type="datetimeFigureOut">
               <a:rPr lang="en-US" smtClean="0"/>
-              <a:t>6/18/2019</a:t>
+              <a:t>5/14/2020</a:t>
             </a:fld>
             <a:endParaRPr lang="en-US"/>
           </a:p>
@@ -470,7 +470,7 @@
           <a:p>
             <a:fld id="{D5D811E7-D537-4010-8288-CC65B28B2855}" type="datetimeFigureOut">
               <a:rPr lang="en-US" smtClean="0"/>
-              <a:t>6/18/2019</a:t>
+              <a:t>5/14/2020</a:t>
             </a:fld>
             <a:endParaRPr lang="en-US"/>
           </a:p>
@@ -678,7 +678,7 @@
           <a:p>
             <a:fld id="{D5D811E7-D537-4010-8288-CC65B28B2855}" type="datetimeFigureOut">
               <a:rPr lang="en-US" smtClean="0"/>
-              <a:t>6/18/2019</a:t>
+              <a:t>5/14/2020</a:t>
             </a:fld>
             <a:endParaRPr lang="en-US"/>
           </a:p>
@@ -876,7 +876,7 @@
           <a:p>
             <a:fld id="{D5D811E7-D537-4010-8288-CC65B28B2855}" type="datetimeFigureOut">
               <a:rPr lang="en-US" smtClean="0"/>
-              <a:t>6/18/2019</a:t>
+              <a:t>5/14/2020</a:t>
             </a:fld>
             <a:endParaRPr lang="en-US"/>
           </a:p>
@@ -1151,7 +1151,7 @@
           <a:p>
             <a:fld id="{D5D811E7-D537-4010-8288-CC65B28B2855}" type="datetimeFigureOut">
               <a:rPr lang="en-US" smtClean="0"/>
-              <a:t>6/18/2019</a:t>
+              <a:t>5/14/2020</a:t>
             </a:fld>
             <a:endParaRPr lang="en-US"/>
           </a:p>
@@ -1416,7 +1416,7 @@
           <a:p>
             <a:fld id="{D5D811E7-D537-4010-8288-CC65B28B2855}" type="datetimeFigureOut">
               <a:rPr lang="en-US" smtClean="0"/>
-              <a:t>6/18/2019</a:t>
+              <a:t>5/14/2020</a:t>
             </a:fld>
             <a:endParaRPr lang="en-US"/>
           </a:p>
@@ -1828,7 +1828,7 @@
           <a:p>
             <a:fld id="{D5D811E7-D537-4010-8288-CC65B28B2855}" type="datetimeFigureOut">
               <a:rPr lang="en-US" smtClean="0"/>
-              <a:t>6/18/2019</a:t>
+              <a:t>5/14/2020</a:t>
             </a:fld>
             <a:endParaRPr lang="en-US"/>
           </a:p>
@@ -1969,7 +1969,7 @@
           <a:p>
             <a:fld id="{D5D811E7-D537-4010-8288-CC65B28B2855}" type="datetimeFigureOut">
               <a:rPr lang="en-US" smtClean="0"/>
-              <a:t>6/18/2019</a:t>
+              <a:t>5/14/2020</a:t>
             </a:fld>
             <a:endParaRPr lang="en-US"/>
           </a:p>
@@ -2082,7 +2082,7 @@
           <a:p>
             <a:fld id="{D5D811E7-D537-4010-8288-CC65B28B2855}" type="datetimeFigureOut">
               <a:rPr lang="en-US" smtClean="0"/>
-              <a:t>6/18/2019</a:t>
+              <a:t>5/14/2020</a:t>
             </a:fld>
             <a:endParaRPr lang="en-US"/>
           </a:p>
@@ -2393,7 +2393,7 @@
           <a:p>
             <a:fld id="{D5D811E7-D537-4010-8288-CC65B28B2855}" type="datetimeFigureOut">
               <a:rPr lang="en-US" smtClean="0"/>
-              <a:t>6/18/2019</a:t>
+              <a:t>5/14/2020</a:t>
             </a:fld>
             <a:endParaRPr lang="en-US"/>
           </a:p>
@@ -2681,7 +2681,7 @@
           <a:p>
             <a:fld id="{D5D811E7-D537-4010-8288-CC65B28B2855}" type="datetimeFigureOut">
               <a:rPr lang="en-US" smtClean="0"/>
-              <a:t>6/18/2019</a:t>
+              <a:t>5/14/2020</a:t>
             </a:fld>
             <a:endParaRPr lang="en-US"/>
           </a:p>
@@ -2922,7 +2922,7 @@
           <a:p>
             <a:fld id="{D5D811E7-D537-4010-8288-CC65B28B2855}" type="datetimeFigureOut">
               <a:rPr lang="en-US" smtClean="0"/>
-              <a:t>6/18/2019</a:t>
+              <a:t>5/14/2020</a:t>
             </a:fld>
             <a:endParaRPr lang="en-US"/>
           </a:p>
@@ -20492,17 +20492,23 @@
         </p:nvSpPr>
         <p:spPr>
           <a:xfrm>
-            <a:off x="4980436" y="967186"/>
-            <a:ext cx="1289154" cy="607102"/>
+            <a:off x="4610100" y="1371600"/>
+            <a:ext cx="1028700" cy="342900"/>
           </a:xfrm>
           <a:prstGeom prst="rect">
             <a:avLst/>
           </a:prstGeom>
           <a:solidFill>
-            <a:schemeClr val="bg1">
-              <a:lumMod val="95000"/>
+            <a:schemeClr val="accent5">
+              <a:lumMod val="40000"/>
+              <a:lumOff val="60000"/>
             </a:schemeClr>
           </a:solidFill>
+          <a:ln>
+            <a:solidFill>
+              <a:schemeClr val="accent1"/>
+            </a:solidFill>
+          </a:ln>
         </p:spPr>
         <p:style>
           <a:lnRef idx="2">
@@ -20526,7 +20532,7 @@
           <a:p>
             <a:pPr algn="ctr"/>
             <a:r>
-              <a:rPr lang="en-US" sz="2400" dirty="0">
+              <a:rPr lang="en-US" sz="1200" b="1" i="1" dirty="0">
                 <a:solidFill>
                   <a:schemeClr val="tx1"/>
                 </a:solidFill>
@@ -20550,17 +20556,23 @@
         </p:nvSpPr>
         <p:spPr>
           <a:xfrm>
-            <a:off x="3877767" y="2782658"/>
-            <a:ext cx="1289154" cy="607102"/>
+            <a:off x="1524000" y="2171700"/>
+            <a:ext cx="1028700" cy="342900"/>
           </a:xfrm>
           <a:prstGeom prst="rect">
             <a:avLst/>
           </a:prstGeom>
           <a:solidFill>
-            <a:schemeClr val="bg1">
-              <a:lumMod val="95000"/>
+            <a:schemeClr val="accent5">
+              <a:lumMod val="40000"/>
+              <a:lumOff val="60000"/>
             </a:schemeClr>
           </a:solidFill>
+          <a:ln>
+            <a:solidFill>
+              <a:schemeClr val="accent1"/>
+            </a:solidFill>
+          </a:ln>
         </p:spPr>
         <p:style>
           <a:lnRef idx="2">
@@ -20584,22 +20596,22 @@
           <a:p>
             <a:pPr algn="ctr"/>
             <a:r>
-              <a:rPr lang="en-US" sz="2400" dirty="0">
+              <a:rPr lang="en-US" sz="1200" b="1" i="1" dirty="0">
                 <a:solidFill>
                   <a:schemeClr val="tx1"/>
                 </a:solidFill>
               </a:rPr>
-              <a:t>Prompt</a:t>
+              <a:t>Prompts</a:t>
             </a:r>
           </a:p>
         </p:txBody>
       </p:sp>
       <p:sp>
         <p:nvSpPr>
-          <p:cNvPr id="8" name="Rectangle 7">
-            <a:extLst>
-              <a:ext uri="{FF2B5EF4-FFF2-40B4-BE49-F238E27FC236}">
-                <a16:creationId xmlns:a16="http://schemas.microsoft.com/office/drawing/2014/main" id="{1959097C-DB64-4EF0-9A3A-CC7BA340E5CA}"/>
+          <p:cNvPr id="52" name="Rectangle 51">
+            <a:extLst>
+              <a:ext uri="{FF2B5EF4-FFF2-40B4-BE49-F238E27FC236}">
+                <a16:creationId xmlns:a16="http://schemas.microsoft.com/office/drawing/2014/main" id="{2808A4B3-EB28-4FA2-85EE-4ADC51E725C3}"/>
               </a:ext>
             </a:extLst>
           </p:cNvPr>
@@ -20608,15 +20620,23 @@
         </p:nvSpPr>
         <p:spPr>
           <a:xfrm>
-            <a:off x="2753327" y="4686299"/>
-            <a:ext cx="1484302" cy="610375"/>
+            <a:off x="2781300" y="2171700"/>
+            <a:ext cx="1028700" cy="342900"/>
           </a:xfrm>
           <a:prstGeom prst="rect">
             <a:avLst/>
           </a:prstGeom>
           <a:solidFill>
-            <a:schemeClr val="bg1"/>
+            <a:schemeClr val="accent5">
+              <a:lumMod val="40000"/>
+              <a:lumOff val="60000"/>
+            </a:schemeClr>
           </a:solidFill>
+          <a:ln>
+            <a:solidFill>
+              <a:schemeClr val="accent1"/>
+            </a:solidFill>
+          </a:ln>
         </p:spPr>
         <p:style>
           <a:lnRef idx="2">
@@ -20640,22 +20660,22 @@
           <a:p>
             <a:pPr algn="ctr"/>
             <a:r>
-              <a:rPr lang="en-US" sz="2400" dirty="0">
+              <a:rPr lang="en-US" sz="1200" b="1" dirty="0">
                 <a:solidFill>
                   <a:schemeClr val="tx1"/>
                 </a:solidFill>
               </a:rPr>
-              <a:t>Number</a:t>
+              <a:t>Waterfall</a:t>
             </a:r>
           </a:p>
         </p:txBody>
       </p:sp>
       <p:sp>
         <p:nvSpPr>
-          <p:cNvPr id="9" name="Rectangle 8">
-            <a:extLst>
-              <a:ext uri="{FF2B5EF4-FFF2-40B4-BE49-F238E27FC236}">
-                <a16:creationId xmlns:a16="http://schemas.microsoft.com/office/drawing/2014/main" id="{1FBF5A4D-E500-4BB6-98B5-09DE149BEEBD}"/>
+          <p:cNvPr id="44" name="Rectangle 43">
+            <a:extLst>
+              <a:ext uri="{FF2B5EF4-FFF2-40B4-BE49-F238E27FC236}">
+                <a16:creationId xmlns:a16="http://schemas.microsoft.com/office/drawing/2014/main" id="{AA42EF80-290F-471E-B639-7BB24E5DEA64}"/>
               </a:ext>
             </a:extLst>
           </p:cNvPr>
@@ -20664,15 +20684,23 @@
         </p:nvSpPr>
         <p:spPr>
           <a:xfrm>
-            <a:off x="1016499" y="4686299"/>
-            <a:ext cx="1040559" cy="612865"/>
+            <a:off x="5981700" y="2971800"/>
+            <a:ext cx="1028700" cy="342900"/>
           </a:xfrm>
           <a:prstGeom prst="rect">
             <a:avLst/>
           </a:prstGeom>
           <a:solidFill>
-            <a:schemeClr val="bg1"/>
+            <a:schemeClr val="accent5">
+              <a:lumMod val="40000"/>
+              <a:lumOff val="60000"/>
+            </a:schemeClr>
           </a:solidFill>
+          <a:ln>
+            <a:solidFill>
+              <a:schemeClr val="accent1"/>
+            </a:solidFill>
+          </a:ln>
         </p:spPr>
         <p:style>
           <a:lnRef idx="2">
@@ -20696,22 +20724,22 @@
           <a:p>
             <a:pPr algn="ctr"/>
             <a:r>
-              <a:rPr lang="en-US" sz="2400" dirty="0">
+              <a:rPr lang="en-US" sz="1200" b="1" dirty="0">
                 <a:solidFill>
                   <a:schemeClr val="tx1"/>
                 </a:solidFill>
               </a:rPr>
-              <a:t>Text</a:t>
+              <a:t>Component</a:t>
             </a:r>
           </a:p>
         </p:txBody>
       </p:sp>
       <p:sp>
         <p:nvSpPr>
-          <p:cNvPr id="10" name="Rectangle 9">
-            <a:extLst>
-              <a:ext uri="{FF2B5EF4-FFF2-40B4-BE49-F238E27FC236}">
-                <a16:creationId xmlns:a16="http://schemas.microsoft.com/office/drawing/2014/main" id="{76D8E5F4-1072-45A4-8E07-88496CE3D194}"/>
+          <p:cNvPr id="45" name="Rectangle 44">
+            <a:extLst>
+              <a:ext uri="{FF2B5EF4-FFF2-40B4-BE49-F238E27FC236}">
+                <a16:creationId xmlns:a16="http://schemas.microsoft.com/office/drawing/2014/main" id="{AB2FA0D8-3CAE-424D-8272-2D24D6A5DCE8}"/>
               </a:ext>
             </a:extLst>
           </p:cNvPr>
@@ -20720,15 +20748,23 @@
         </p:nvSpPr>
         <p:spPr>
           <a:xfrm>
-            <a:off x="5021362" y="4686299"/>
-            <a:ext cx="1554886" cy="610375"/>
+            <a:off x="7239000" y="2971800"/>
+            <a:ext cx="1028700" cy="342900"/>
           </a:xfrm>
           <a:prstGeom prst="rect">
             <a:avLst/>
           </a:prstGeom>
           <a:solidFill>
-            <a:schemeClr val="bg1"/>
+            <a:schemeClr val="accent5">
+              <a:lumMod val="40000"/>
+              <a:lumOff val="60000"/>
+            </a:schemeClr>
           </a:solidFill>
+          <a:ln>
+            <a:solidFill>
+              <a:schemeClr val="accent1"/>
+            </a:solidFill>
+          </a:ln>
         </p:spPr>
         <p:style>
           <a:lnRef idx="2">
@@ -20752,22 +20788,206 @@
           <a:p>
             <a:pPr algn="ctr"/>
             <a:r>
-              <a:rPr lang="en-US" sz="2400" dirty="0">
+              <a:rPr lang="en-US" sz="1200" b="1" dirty="0">
                 <a:solidFill>
                   <a:schemeClr val="tx1"/>
                 </a:solidFill>
               </a:rPr>
-              <a:t>Confirm</a:t>
+              <a:t>Adaptive</a:t>
             </a:r>
           </a:p>
         </p:txBody>
       </p:sp>
+      <p:cxnSp>
+        <p:nvCxnSpPr>
+          <p:cNvPr id="51" name="Connector: Elbow 50">
+            <a:extLst>
+              <a:ext uri="{FF2B5EF4-FFF2-40B4-BE49-F238E27FC236}">
+                <a16:creationId xmlns:a16="http://schemas.microsoft.com/office/drawing/2014/main" id="{FA257E32-583C-4A92-A6E2-16BC25BABF19}"/>
+              </a:ext>
+            </a:extLst>
+          </p:cNvPr>
+          <p:cNvCxnSpPr>
+            <a:cxnSpLocks/>
+            <a:stCxn id="4" idx="2"/>
+            <a:endCxn id="6" idx="0"/>
+          </p:cNvCxnSpPr>
+          <p:nvPr/>
+        </p:nvCxnSpPr>
+        <p:spPr>
+          <a:xfrm rot="5400000">
+            <a:off x="3352800" y="400050"/>
+            <a:ext cx="457200" cy="3086100"/>
+          </a:xfrm>
+          <a:prstGeom prst="bentConnector3">
+            <a:avLst/>
+          </a:prstGeom>
+          <a:ln>
+            <a:solidFill>
+              <a:schemeClr val="accent1"/>
+            </a:solidFill>
+            <a:tailEnd type="triangle"/>
+          </a:ln>
+        </p:spPr>
+        <p:style>
+          <a:lnRef idx="1">
+            <a:schemeClr val="accent1"/>
+          </a:lnRef>
+          <a:fillRef idx="0">
+            <a:schemeClr val="accent1"/>
+          </a:fillRef>
+          <a:effectRef idx="0">
+            <a:schemeClr val="accent1"/>
+          </a:effectRef>
+          <a:fontRef idx="minor">
+            <a:schemeClr val="tx1"/>
+          </a:fontRef>
+        </p:style>
+      </p:cxnSp>
+      <p:cxnSp>
+        <p:nvCxnSpPr>
+          <p:cNvPr id="55" name="Connector: Elbow 54">
+            <a:extLst>
+              <a:ext uri="{FF2B5EF4-FFF2-40B4-BE49-F238E27FC236}">
+                <a16:creationId xmlns:a16="http://schemas.microsoft.com/office/drawing/2014/main" id="{0799A96D-DFB9-4C7D-85BC-07D94F5F5069}"/>
+              </a:ext>
+            </a:extLst>
+          </p:cNvPr>
+          <p:cNvCxnSpPr>
+            <a:cxnSpLocks/>
+            <a:stCxn id="4" idx="2"/>
+            <a:endCxn id="52" idx="0"/>
+          </p:cNvCxnSpPr>
+          <p:nvPr/>
+        </p:nvCxnSpPr>
+        <p:spPr>
+          <a:xfrm rot="5400000">
+            <a:off x="3981450" y="1028700"/>
+            <a:ext cx="457200" cy="1828800"/>
+          </a:xfrm>
+          <a:prstGeom prst="bentConnector3">
+            <a:avLst/>
+          </a:prstGeom>
+          <a:ln>
+            <a:solidFill>
+              <a:schemeClr val="accent1"/>
+            </a:solidFill>
+            <a:tailEnd type="triangle"/>
+          </a:ln>
+        </p:spPr>
+        <p:style>
+          <a:lnRef idx="1">
+            <a:schemeClr val="accent1"/>
+          </a:lnRef>
+          <a:fillRef idx="0">
+            <a:schemeClr val="accent1"/>
+          </a:fillRef>
+          <a:effectRef idx="0">
+            <a:schemeClr val="accent1"/>
+          </a:effectRef>
+          <a:fontRef idx="minor">
+            <a:schemeClr val="tx1"/>
+          </a:fontRef>
+        </p:style>
+      </p:cxnSp>
+      <p:cxnSp>
+        <p:nvCxnSpPr>
+          <p:cNvPr id="58" name="Connector: Elbow 57">
+            <a:extLst>
+              <a:ext uri="{FF2B5EF4-FFF2-40B4-BE49-F238E27FC236}">
+                <a16:creationId xmlns:a16="http://schemas.microsoft.com/office/drawing/2014/main" id="{9D53E86C-BDE1-4B25-965B-60C7D1777952}"/>
+              </a:ext>
+            </a:extLst>
+          </p:cNvPr>
+          <p:cNvCxnSpPr>
+            <a:cxnSpLocks/>
+            <a:stCxn id="4" idx="2"/>
+            <a:endCxn id="70" idx="0"/>
+          </p:cNvCxnSpPr>
+          <p:nvPr/>
+        </p:nvCxnSpPr>
+        <p:spPr>
+          <a:xfrm rot="16200000" flipH="1">
+            <a:off x="5867400" y="971550"/>
+            <a:ext cx="457200" cy="1943100"/>
+          </a:xfrm>
+          <a:prstGeom prst="bentConnector3">
+            <a:avLst/>
+          </a:prstGeom>
+          <a:ln>
+            <a:solidFill>
+              <a:schemeClr val="accent1"/>
+            </a:solidFill>
+            <a:tailEnd type="triangle"/>
+          </a:ln>
+        </p:spPr>
+        <p:style>
+          <a:lnRef idx="1">
+            <a:schemeClr val="accent1"/>
+          </a:lnRef>
+          <a:fillRef idx="0">
+            <a:schemeClr val="accent1"/>
+          </a:fillRef>
+          <a:effectRef idx="0">
+            <a:schemeClr val="accent1"/>
+          </a:effectRef>
+          <a:fontRef idx="minor">
+            <a:schemeClr val="tx1"/>
+          </a:fontRef>
+        </p:style>
+      </p:cxnSp>
+      <p:cxnSp>
+        <p:nvCxnSpPr>
+          <p:cNvPr id="60" name="Connector: Elbow 59">
+            <a:extLst>
+              <a:ext uri="{FF2B5EF4-FFF2-40B4-BE49-F238E27FC236}">
+                <a16:creationId xmlns:a16="http://schemas.microsoft.com/office/drawing/2014/main" id="{0D972B02-BCD2-438B-AF68-8CFEE9517323}"/>
+              </a:ext>
+            </a:extLst>
+          </p:cNvPr>
+          <p:cNvCxnSpPr>
+            <a:cxnSpLocks/>
+            <a:stCxn id="70" idx="2"/>
+            <a:endCxn id="45" idx="0"/>
+          </p:cNvCxnSpPr>
+          <p:nvPr/>
+        </p:nvCxnSpPr>
+        <p:spPr>
+          <a:xfrm rot="16200000" flipH="1">
+            <a:off x="7181850" y="2400300"/>
+            <a:ext cx="457200" cy="685800"/>
+          </a:xfrm>
+          <a:prstGeom prst="bentConnector3">
+            <a:avLst/>
+          </a:prstGeom>
+          <a:ln>
+            <a:solidFill>
+              <a:schemeClr val="accent1"/>
+            </a:solidFill>
+            <a:tailEnd type="triangle"/>
+          </a:ln>
+        </p:spPr>
+        <p:style>
+          <a:lnRef idx="1">
+            <a:schemeClr val="accent1"/>
+          </a:lnRef>
+          <a:fillRef idx="0">
+            <a:schemeClr val="accent1"/>
+          </a:fillRef>
+          <a:effectRef idx="0">
+            <a:schemeClr val="accent1"/>
+          </a:effectRef>
+          <a:fontRef idx="minor">
+            <a:schemeClr val="tx1"/>
+          </a:fontRef>
+        </p:style>
+      </p:cxnSp>
       <p:sp>
         <p:nvSpPr>
-          <p:cNvPr id="11" name="Rectangle 10">
-            <a:extLst>
-              <a:ext uri="{FF2B5EF4-FFF2-40B4-BE49-F238E27FC236}">
-                <a16:creationId xmlns:a16="http://schemas.microsoft.com/office/drawing/2014/main" id="{96DBBA4D-FA79-44BF-A452-31AF41674AC6}"/>
+          <p:cNvPr id="65" name="Rectangle 64">
+            <a:extLst>
+              <a:ext uri="{FF2B5EF4-FFF2-40B4-BE49-F238E27FC236}">
+                <a16:creationId xmlns:a16="http://schemas.microsoft.com/office/drawing/2014/main" id="{50ACD375-FDB0-423A-9104-0C3D69168586}"/>
               </a:ext>
             </a:extLst>
           </p:cNvPr>
@@ -20776,15 +20996,23 @@
         </p:nvSpPr>
         <p:spPr>
           <a:xfrm>
-            <a:off x="7295972" y="4689572"/>
-            <a:ext cx="1486362" cy="593454"/>
+            <a:off x="4038600" y="2171700"/>
+            <a:ext cx="1028700" cy="342900"/>
           </a:xfrm>
           <a:prstGeom prst="rect">
             <a:avLst/>
           </a:prstGeom>
           <a:solidFill>
-            <a:schemeClr val="bg1"/>
+            <a:schemeClr val="accent5">
+              <a:lumMod val="40000"/>
+              <a:lumOff val="60000"/>
+            </a:schemeClr>
           </a:solidFill>
+          <a:ln>
+            <a:solidFill>
+              <a:schemeClr val="accent1"/>
+            </a:solidFill>
+          </a:ln>
         </p:spPr>
         <p:style>
           <a:lnRef idx="2">
@@ -20808,22 +21036,72 @@
           <a:p>
             <a:pPr algn="ctr"/>
             <a:r>
-              <a:rPr lang="en-US" sz="2400" dirty="0">
+              <a:rPr lang="en-US" sz="1200" b="1" dirty="0" err="1">
                 <a:solidFill>
                   <a:schemeClr val="tx1"/>
                 </a:solidFill>
               </a:rPr>
-              <a:t>Choice</a:t>
+              <a:t>QnAMaker</a:t>
             </a:r>
+            <a:endParaRPr lang="en-US" sz="1200" b="1" dirty="0">
+              <a:solidFill>
+                <a:schemeClr val="tx1"/>
+              </a:solidFill>
+            </a:endParaRPr>
           </a:p>
         </p:txBody>
       </p:sp>
+      <p:cxnSp>
+        <p:nvCxnSpPr>
+          <p:cNvPr id="67" name="Connector: Elbow 66">
+            <a:extLst>
+              <a:ext uri="{FF2B5EF4-FFF2-40B4-BE49-F238E27FC236}">
+                <a16:creationId xmlns:a16="http://schemas.microsoft.com/office/drawing/2014/main" id="{9458854F-6EDF-4630-A4CD-AF354E0A47DA}"/>
+              </a:ext>
+            </a:extLst>
+          </p:cNvPr>
+          <p:cNvCxnSpPr>
+            <a:cxnSpLocks/>
+            <a:stCxn id="4" idx="2"/>
+            <a:endCxn id="65" idx="0"/>
+          </p:cNvCxnSpPr>
+          <p:nvPr/>
+        </p:nvCxnSpPr>
+        <p:spPr>
+          <a:xfrm rot="5400000">
+            <a:off x="4610100" y="1657350"/>
+            <a:ext cx="457200" cy="571500"/>
+          </a:xfrm>
+          <a:prstGeom prst="bentConnector3">
+            <a:avLst>
+              <a:gd name="adj1" fmla="val 50000"/>
+            </a:avLst>
+          </a:prstGeom>
+          <a:ln>
+            <a:tailEnd type="triangle"/>
+          </a:ln>
+        </p:spPr>
+        <p:style>
+          <a:lnRef idx="1">
+            <a:schemeClr val="accent1"/>
+          </a:lnRef>
+          <a:fillRef idx="0">
+            <a:schemeClr val="accent1"/>
+          </a:fillRef>
+          <a:effectRef idx="0">
+            <a:schemeClr val="accent1"/>
+          </a:effectRef>
+          <a:fontRef idx="minor">
+            <a:schemeClr val="tx1"/>
+          </a:fontRef>
+        </p:style>
+      </p:cxnSp>
       <p:sp>
         <p:nvSpPr>
-          <p:cNvPr id="14" name="Rectangle 13">
-            <a:extLst>
-              <a:ext uri="{FF2B5EF4-FFF2-40B4-BE49-F238E27FC236}">
-                <a16:creationId xmlns:a16="http://schemas.microsoft.com/office/drawing/2014/main" id="{DA1158AF-D3B4-47F9-A3A1-C19F04506780}"/>
+          <p:cNvPr id="70" name="Rectangle 69">
+            <a:extLst>
+              <a:ext uri="{FF2B5EF4-FFF2-40B4-BE49-F238E27FC236}">
+                <a16:creationId xmlns:a16="http://schemas.microsoft.com/office/drawing/2014/main" id="{A4DE8C21-8C83-4D43-A2BE-6F06CD21ACA4}"/>
               </a:ext>
             </a:extLst>
           </p:cNvPr>
@@ -20832,15 +21110,23 @@
         </p:nvSpPr>
         <p:spPr>
           <a:xfrm>
-            <a:off x="9478603" y="4686299"/>
-            <a:ext cx="1951396" cy="590365"/>
+            <a:off x="6553200" y="2171700"/>
+            <a:ext cx="1028700" cy="342900"/>
           </a:xfrm>
           <a:prstGeom prst="rect">
             <a:avLst/>
           </a:prstGeom>
           <a:solidFill>
-            <a:schemeClr val="bg1"/>
+            <a:schemeClr val="accent5">
+              <a:lumMod val="40000"/>
+              <a:lumOff val="60000"/>
+            </a:schemeClr>
           </a:solidFill>
+          <a:ln>
+            <a:solidFill>
+              <a:schemeClr val="accent1"/>
+            </a:solidFill>
+          </a:ln>
         </p:spPr>
         <p:style>
           <a:lnRef idx="2">
@@ -20864,36 +21150,36 @@
           <a:p>
             <a:pPr algn="ctr"/>
             <a:r>
-              <a:rPr lang="en-US" sz="2400" dirty="0">
+              <a:rPr lang="en-US" sz="1200" b="1" i="1" dirty="0">
                 <a:solidFill>
                   <a:schemeClr val="tx1"/>
                 </a:solidFill>
               </a:rPr>
-              <a:t>Attachment</a:t>
+              <a:t>Container</a:t>
             </a:r>
           </a:p>
         </p:txBody>
       </p:sp>
       <p:cxnSp>
         <p:nvCxnSpPr>
-          <p:cNvPr id="25" name="Connector: Elbow 24">
-            <a:extLst>
-              <a:ext uri="{FF2B5EF4-FFF2-40B4-BE49-F238E27FC236}">
-                <a16:creationId xmlns:a16="http://schemas.microsoft.com/office/drawing/2014/main" id="{CE38D585-8980-49FE-A1E2-41CA16C261A5}"/>
+          <p:cNvPr id="76" name="Connector: Elbow 75">
+            <a:extLst>
+              <a:ext uri="{FF2B5EF4-FFF2-40B4-BE49-F238E27FC236}">
+                <a16:creationId xmlns:a16="http://schemas.microsoft.com/office/drawing/2014/main" id="{2ECFF4A5-1E7F-47A9-A677-04066E93D81B}"/>
               </a:ext>
             </a:extLst>
           </p:cNvPr>
           <p:cNvCxnSpPr>
             <a:cxnSpLocks/>
-            <a:stCxn id="14" idx="0"/>
-            <a:endCxn id="6" idx="2"/>
+            <a:stCxn id="70" idx="2"/>
+            <a:endCxn id="44" idx="0"/>
           </p:cNvCxnSpPr>
           <p:nvPr/>
         </p:nvCxnSpPr>
         <p:spPr>
-          <a:xfrm rot="16200000" flipV="1">
-            <a:off x="6840054" y="1072051"/>
-            <a:ext cx="1296539" cy="5931957"/>
+          <a:xfrm rot="5400000">
+            <a:off x="6553200" y="2457450"/>
+            <a:ext cx="457200" cy="571500"/>
           </a:xfrm>
           <a:prstGeom prst="bentConnector3">
             <a:avLst/>
@@ -20917,184 +21203,12 @@
           </a:fontRef>
         </p:style>
       </p:cxnSp>
-      <p:cxnSp>
-        <p:nvCxnSpPr>
-          <p:cNvPr id="29" name="Connector: Elbow 28">
-            <a:extLst>
-              <a:ext uri="{FF2B5EF4-FFF2-40B4-BE49-F238E27FC236}">
-                <a16:creationId xmlns:a16="http://schemas.microsoft.com/office/drawing/2014/main" id="{DBC1DBFF-FD31-45BA-950E-EEB093969414}"/>
-              </a:ext>
-            </a:extLst>
-          </p:cNvPr>
-          <p:cNvCxnSpPr>
-            <a:cxnSpLocks/>
-            <a:stCxn id="11" idx="0"/>
-            <a:endCxn id="6" idx="2"/>
-          </p:cNvCxnSpPr>
-          <p:nvPr/>
-        </p:nvCxnSpPr>
-        <p:spPr>
-          <a:xfrm rot="16200000" flipV="1">
-            <a:off x="5630843" y="2281261"/>
-            <a:ext cx="1299812" cy="3516809"/>
-          </a:xfrm>
-          <a:prstGeom prst="bentConnector3">
-            <a:avLst/>
-          </a:prstGeom>
-          <a:ln>
-            <a:tailEnd type="triangle"/>
-          </a:ln>
-        </p:spPr>
-        <p:style>
-          <a:lnRef idx="1">
-            <a:schemeClr val="accent1"/>
-          </a:lnRef>
-          <a:fillRef idx="0">
-            <a:schemeClr val="accent1"/>
-          </a:fillRef>
-          <a:effectRef idx="0">
-            <a:schemeClr val="accent1"/>
-          </a:effectRef>
-          <a:fontRef idx="minor">
-            <a:schemeClr val="tx1"/>
-          </a:fontRef>
-        </p:style>
-      </p:cxnSp>
-      <p:cxnSp>
-        <p:nvCxnSpPr>
-          <p:cNvPr id="33" name="Connector: Elbow 32">
-            <a:extLst>
-              <a:ext uri="{FF2B5EF4-FFF2-40B4-BE49-F238E27FC236}">
-                <a16:creationId xmlns:a16="http://schemas.microsoft.com/office/drawing/2014/main" id="{F286D459-B6AA-43A5-8628-D511871C19B0}"/>
-              </a:ext>
-            </a:extLst>
-          </p:cNvPr>
-          <p:cNvCxnSpPr>
-            <a:cxnSpLocks/>
-            <a:stCxn id="10" idx="0"/>
-            <a:endCxn id="6" idx="2"/>
-          </p:cNvCxnSpPr>
-          <p:nvPr/>
-        </p:nvCxnSpPr>
-        <p:spPr>
-          <a:xfrm rot="16200000" flipV="1">
-            <a:off x="4512306" y="3399799"/>
-            <a:ext cx="1296539" cy="1276461"/>
-          </a:xfrm>
-          <a:prstGeom prst="bentConnector3">
-            <a:avLst/>
-          </a:prstGeom>
-          <a:ln>
-            <a:tailEnd type="triangle"/>
-          </a:ln>
-        </p:spPr>
-        <p:style>
-          <a:lnRef idx="1">
-            <a:schemeClr val="accent1"/>
-          </a:lnRef>
-          <a:fillRef idx="0">
-            <a:schemeClr val="accent1"/>
-          </a:fillRef>
-          <a:effectRef idx="0">
-            <a:schemeClr val="accent1"/>
-          </a:effectRef>
-          <a:fontRef idx="minor">
-            <a:schemeClr val="tx1"/>
-          </a:fontRef>
-        </p:style>
-      </p:cxnSp>
-      <p:cxnSp>
-        <p:nvCxnSpPr>
-          <p:cNvPr id="36" name="Connector: Elbow 35">
-            <a:extLst>
-              <a:ext uri="{FF2B5EF4-FFF2-40B4-BE49-F238E27FC236}">
-                <a16:creationId xmlns:a16="http://schemas.microsoft.com/office/drawing/2014/main" id="{028A9BC6-0D80-46B7-8FCA-D04790625F7F}"/>
-              </a:ext>
-            </a:extLst>
-          </p:cNvPr>
-          <p:cNvCxnSpPr>
-            <a:cxnSpLocks/>
-            <a:stCxn id="8" idx="0"/>
-            <a:endCxn id="6" idx="2"/>
-          </p:cNvCxnSpPr>
-          <p:nvPr/>
-        </p:nvCxnSpPr>
-        <p:spPr>
-          <a:xfrm rot="5400000" flipH="1" flipV="1">
-            <a:off x="3360642" y="3524597"/>
-            <a:ext cx="1296539" cy="1026866"/>
-          </a:xfrm>
-          <a:prstGeom prst="bentConnector3">
-            <a:avLst/>
-          </a:prstGeom>
-          <a:ln>
-            <a:tailEnd type="triangle"/>
-          </a:ln>
-        </p:spPr>
-        <p:style>
-          <a:lnRef idx="1">
-            <a:schemeClr val="accent1"/>
-          </a:lnRef>
-          <a:fillRef idx="0">
-            <a:schemeClr val="accent1"/>
-          </a:fillRef>
-          <a:effectRef idx="0">
-            <a:schemeClr val="accent1"/>
-          </a:effectRef>
-          <a:fontRef idx="minor">
-            <a:schemeClr val="tx1"/>
-          </a:fontRef>
-        </p:style>
-      </p:cxnSp>
-      <p:cxnSp>
-        <p:nvCxnSpPr>
-          <p:cNvPr id="38" name="Connector: Elbow 37">
-            <a:extLst>
-              <a:ext uri="{FF2B5EF4-FFF2-40B4-BE49-F238E27FC236}">
-                <a16:creationId xmlns:a16="http://schemas.microsoft.com/office/drawing/2014/main" id="{8A2EE751-1059-4D5E-BDF0-F72D177587F4}"/>
-              </a:ext>
-            </a:extLst>
-          </p:cNvPr>
-          <p:cNvCxnSpPr>
-            <a:cxnSpLocks/>
-            <a:stCxn id="9" idx="0"/>
-            <a:endCxn id="6" idx="2"/>
-          </p:cNvCxnSpPr>
-          <p:nvPr/>
-        </p:nvCxnSpPr>
-        <p:spPr>
-          <a:xfrm rot="5400000" flipH="1" flipV="1">
-            <a:off x="2381292" y="2545248"/>
-            <a:ext cx="1296539" cy="2985565"/>
-          </a:xfrm>
-          <a:prstGeom prst="bentConnector3">
-            <a:avLst/>
-          </a:prstGeom>
-          <a:ln>
-            <a:tailEnd type="triangle"/>
-          </a:ln>
-        </p:spPr>
-        <p:style>
-          <a:lnRef idx="1">
-            <a:schemeClr val="accent1"/>
-          </a:lnRef>
-          <a:fillRef idx="0">
-            <a:schemeClr val="accent1"/>
-          </a:fillRef>
-          <a:effectRef idx="0">
-            <a:schemeClr val="accent1"/>
-          </a:effectRef>
-          <a:fontRef idx="minor">
-            <a:schemeClr val="tx1"/>
-          </a:fontRef>
-        </p:style>
-      </p:cxnSp>
       <p:sp>
         <p:nvSpPr>
-          <p:cNvPr id="52" name="Rectangle 51">
-            <a:extLst>
-              <a:ext uri="{FF2B5EF4-FFF2-40B4-BE49-F238E27FC236}">
-                <a16:creationId xmlns:a16="http://schemas.microsoft.com/office/drawing/2014/main" id="{2808A4B3-EB28-4FA2-85EE-4ADC51E725C3}"/>
+          <p:cNvPr id="80" name="Rectangle 79">
+            <a:extLst>
+              <a:ext uri="{FF2B5EF4-FFF2-40B4-BE49-F238E27FC236}">
+                <a16:creationId xmlns:a16="http://schemas.microsoft.com/office/drawing/2014/main" id="{C554A29B-FF6D-4CF7-BDBE-D82DC9020F35}"/>
               </a:ext>
             </a:extLst>
           </p:cNvPr>
@@ -21103,15 +21217,23 @@
         </p:nvSpPr>
         <p:spPr>
           <a:xfrm>
-            <a:off x="6071142" y="2782656"/>
-            <a:ext cx="1680786" cy="607102"/>
+            <a:off x="5295900" y="2171700"/>
+            <a:ext cx="1028700" cy="342900"/>
           </a:xfrm>
           <a:prstGeom prst="rect">
             <a:avLst/>
           </a:prstGeom>
           <a:solidFill>
-            <a:schemeClr val="bg1"/>
+            <a:schemeClr val="accent5">
+              <a:lumMod val="40000"/>
+              <a:lumOff val="60000"/>
+            </a:schemeClr>
           </a:solidFill>
+          <a:ln>
+            <a:solidFill>
+              <a:schemeClr val="accent1"/>
+            </a:solidFill>
+          </a:ln>
         </p:spPr>
         <p:style>
           <a:lnRef idx="2">
@@ -21135,36 +21257,36 @@
           <a:p>
             <a:pPr algn="ctr"/>
             <a:r>
-              <a:rPr lang="en-US" sz="2400" dirty="0">
+              <a:rPr lang="en-US" sz="1200" b="1" dirty="0">
                 <a:solidFill>
                   <a:schemeClr val="tx1"/>
                 </a:solidFill>
               </a:rPr>
-              <a:t>Waterfall</a:t>
+              <a:t>Skill</a:t>
             </a:r>
           </a:p>
         </p:txBody>
       </p:sp>
       <p:cxnSp>
         <p:nvCxnSpPr>
-          <p:cNvPr id="54" name="Connector: Elbow 53">
-            <a:extLst>
-              <a:ext uri="{FF2B5EF4-FFF2-40B4-BE49-F238E27FC236}">
-                <a16:creationId xmlns:a16="http://schemas.microsoft.com/office/drawing/2014/main" id="{5D4E7EBE-363C-4B2E-9C82-AA8D406BF841}"/>
+          <p:cNvPr id="94" name="Connector: Elbow 93">
+            <a:extLst>
+              <a:ext uri="{FF2B5EF4-FFF2-40B4-BE49-F238E27FC236}">
+                <a16:creationId xmlns:a16="http://schemas.microsoft.com/office/drawing/2014/main" id="{209F0067-599B-4946-AA3E-E6C878A72FC9}"/>
               </a:ext>
             </a:extLst>
           </p:cNvPr>
           <p:cNvCxnSpPr>
             <a:cxnSpLocks/>
-            <a:stCxn id="52" idx="0"/>
-            <a:endCxn id="4" idx="2"/>
+            <a:stCxn id="4" idx="2"/>
+            <a:endCxn id="80" idx="0"/>
           </p:cNvCxnSpPr>
           <p:nvPr/>
         </p:nvCxnSpPr>
         <p:spPr>
-          <a:xfrm rot="16200000" flipV="1">
-            <a:off x="5664090" y="1535211"/>
-            <a:ext cx="1208368" cy="1286522"/>
+          <a:xfrm rot="16200000" flipH="1">
+            <a:off x="5238750" y="1600200"/>
+            <a:ext cx="457200" cy="685800"/>
           </a:xfrm>
           <a:prstGeom prst="bentConnector3">
             <a:avLst/>
@@ -21188,30 +21310,290 @@
           </a:fontRef>
         </p:style>
       </p:cxnSp>
+      <p:sp>
+        <p:nvSpPr>
+          <p:cNvPr id="138" name="Rectangle 137">
+            <a:extLst>
+              <a:ext uri="{FF2B5EF4-FFF2-40B4-BE49-F238E27FC236}">
+                <a16:creationId xmlns:a16="http://schemas.microsoft.com/office/drawing/2014/main" id="{B5675E31-3DEB-47FA-9089-3DBF3CA74EA4}"/>
+              </a:ext>
+            </a:extLst>
+          </p:cNvPr>
+          <p:cNvSpPr/>
+          <p:nvPr/>
+        </p:nvSpPr>
+        <p:spPr>
+          <a:xfrm>
+            <a:off x="8496300" y="2971800"/>
+            <a:ext cx="1028700" cy="342900"/>
+          </a:xfrm>
+          <a:prstGeom prst="rect">
+            <a:avLst/>
+          </a:prstGeom>
+          <a:solidFill>
+            <a:schemeClr val="accent5">
+              <a:lumMod val="40000"/>
+              <a:lumOff val="60000"/>
+            </a:schemeClr>
+          </a:solidFill>
+          <a:ln>
+            <a:solidFill>
+              <a:schemeClr val="accent1"/>
+            </a:solidFill>
+          </a:ln>
+        </p:spPr>
+        <p:style>
+          <a:lnRef idx="2">
+            <a:schemeClr val="accent1">
+              <a:shade val="50000"/>
+            </a:schemeClr>
+          </a:lnRef>
+          <a:fillRef idx="1">
+            <a:schemeClr val="accent1"/>
+          </a:fillRef>
+          <a:effectRef idx="0">
+            <a:schemeClr val="accent1"/>
+          </a:effectRef>
+          <a:fontRef idx="minor">
+            <a:schemeClr val="lt1"/>
+          </a:fontRef>
+        </p:style>
+        <p:txBody>
+          <a:bodyPr rtlCol="0" anchor="ctr"/>
+          <a:lstStyle/>
+          <a:p>
+            <a:pPr algn="ctr"/>
+            <a:r>
+              <a:rPr lang="en-US" sz="1200" b="1" i="1" dirty="0">
+                <a:solidFill>
+                  <a:schemeClr val="tx1"/>
+                </a:solidFill>
+              </a:rPr>
+              <a:t>Actions</a:t>
+            </a:r>
+          </a:p>
+        </p:txBody>
+      </p:sp>
+      <p:sp>
+        <p:nvSpPr>
+          <p:cNvPr id="140" name="Rectangle 139">
+            <a:extLst>
+              <a:ext uri="{FF2B5EF4-FFF2-40B4-BE49-F238E27FC236}">
+                <a16:creationId xmlns:a16="http://schemas.microsoft.com/office/drawing/2014/main" id="{62D20EE6-D9B0-4A2A-B150-C00933E12AE4}"/>
+              </a:ext>
+            </a:extLst>
+          </p:cNvPr>
+          <p:cNvSpPr/>
+          <p:nvPr/>
+        </p:nvSpPr>
+        <p:spPr>
+          <a:xfrm>
+            <a:off x="8496300" y="3543300"/>
+            <a:ext cx="1028700" cy="342900"/>
+          </a:xfrm>
+          <a:prstGeom prst="rect">
+            <a:avLst/>
+          </a:prstGeom>
+          <a:solidFill>
+            <a:schemeClr val="accent5">
+              <a:lumMod val="40000"/>
+              <a:lumOff val="60000"/>
+            </a:schemeClr>
+          </a:solidFill>
+          <a:ln>
+            <a:solidFill>
+              <a:schemeClr val="accent1"/>
+            </a:solidFill>
+          </a:ln>
+        </p:spPr>
+        <p:style>
+          <a:lnRef idx="2">
+            <a:schemeClr val="accent1">
+              <a:shade val="50000"/>
+            </a:schemeClr>
+          </a:lnRef>
+          <a:fillRef idx="1">
+            <a:schemeClr val="accent1"/>
+          </a:fillRef>
+          <a:effectRef idx="0">
+            <a:schemeClr val="accent1"/>
+          </a:effectRef>
+          <a:fontRef idx="minor">
+            <a:schemeClr val="lt1"/>
+          </a:fontRef>
+        </p:style>
+        <p:txBody>
+          <a:bodyPr rtlCol="0" anchor="ctr"/>
+          <a:lstStyle/>
+          <a:p>
+            <a:pPr algn="ctr"/>
+            <a:r>
+              <a:rPr lang="en-US" sz="1200" b="1" i="1" dirty="0">
+                <a:solidFill>
+                  <a:schemeClr val="tx1"/>
+                </a:solidFill>
+              </a:rPr>
+              <a:t>Inputs</a:t>
+            </a:r>
+          </a:p>
+        </p:txBody>
+      </p:sp>
       <p:cxnSp>
         <p:nvCxnSpPr>
-          <p:cNvPr id="56" name="Connector: Elbow 55">
-            <a:extLst>
-              <a:ext uri="{FF2B5EF4-FFF2-40B4-BE49-F238E27FC236}">
-                <a16:creationId xmlns:a16="http://schemas.microsoft.com/office/drawing/2014/main" id="{567571BE-367F-4B4A-905A-254467D0F12B}"/>
+          <p:cNvPr id="142" name="Connector: Elbow 141">
+            <a:extLst>
+              <a:ext uri="{FF2B5EF4-FFF2-40B4-BE49-F238E27FC236}">
+                <a16:creationId xmlns:a16="http://schemas.microsoft.com/office/drawing/2014/main" id="{A897EF20-26E1-4020-9BCA-7D01BECA9CB2}"/>
               </a:ext>
             </a:extLst>
           </p:cNvPr>
           <p:cNvCxnSpPr>
-            <a:stCxn id="6" idx="0"/>
-            <a:endCxn id="4" idx="2"/>
+            <a:cxnSpLocks/>
+            <a:stCxn id="4" idx="2"/>
+            <a:endCxn id="138" idx="0"/>
           </p:cNvCxnSpPr>
           <p:nvPr/>
         </p:nvCxnSpPr>
         <p:spPr>
-          <a:xfrm rot="5400000" flipH="1" flipV="1">
-            <a:off x="4469493" y="1627139"/>
-            <a:ext cx="1208370" cy="1102669"/>
+          <a:xfrm rot="16200000" flipH="1">
+            <a:off x="6438900" y="400050"/>
+            <a:ext cx="1257300" cy="3886200"/>
           </a:xfrm>
           <a:prstGeom prst="bentConnector3">
+            <a:avLst>
+              <a:gd name="adj1" fmla="val 18081"/>
+            </a:avLst>
+          </a:prstGeom>
+          <a:ln>
+            <a:tailEnd type="triangle"/>
+          </a:ln>
+        </p:spPr>
+        <p:style>
+          <a:lnRef idx="1">
+            <a:schemeClr val="accent1"/>
+          </a:lnRef>
+          <a:fillRef idx="0">
+            <a:schemeClr val="accent1"/>
+          </a:fillRef>
+          <a:effectRef idx="0">
+            <a:schemeClr val="accent1"/>
+          </a:effectRef>
+          <a:fontRef idx="minor">
+            <a:schemeClr val="tx1"/>
+          </a:fontRef>
+        </p:style>
+      </p:cxnSp>
+      <p:cxnSp>
+        <p:nvCxnSpPr>
+          <p:cNvPr id="147" name="Straight Arrow Connector 146">
+            <a:extLst>
+              <a:ext uri="{FF2B5EF4-FFF2-40B4-BE49-F238E27FC236}">
+                <a16:creationId xmlns:a16="http://schemas.microsoft.com/office/drawing/2014/main" id="{5D3FC4D4-777A-46AB-97B1-8F696AFF8D6E}"/>
+              </a:ext>
+            </a:extLst>
+          </p:cNvPr>
+          <p:cNvCxnSpPr>
+            <a:stCxn id="138" idx="2"/>
+            <a:endCxn id="140" idx="0"/>
+          </p:cNvCxnSpPr>
+          <p:nvPr/>
+        </p:nvCxnSpPr>
+        <p:spPr>
+          <a:xfrm>
+            <a:off x="9010650" y="3314700"/>
+            <a:ext cx="0" cy="228600"/>
+          </a:xfrm>
+          <a:prstGeom prst="straightConnector1">
             <a:avLst/>
           </a:prstGeom>
           <a:ln>
+            <a:tailEnd type="triangle"/>
+          </a:ln>
+        </p:spPr>
+        <p:style>
+          <a:lnRef idx="1">
+            <a:schemeClr val="accent1"/>
+          </a:lnRef>
+          <a:fillRef idx="0">
+            <a:schemeClr val="accent1"/>
+          </a:fillRef>
+          <a:effectRef idx="0">
+            <a:schemeClr val="accent1"/>
+          </a:effectRef>
+          <a:fontRef idx="minor">
+            <a:schemeClr val="tx1"/>
+          </a:fontRef>
+        </p:style>
+      </p:cxnSp>
+      <p:cxnSp>
+        <p:nvCxnSpPr>
+          <p:cNvPr id="151" name="Straight Arrow Connector 150">
+            <a:extLst>
+              <a:ext uri="{FF2B5EF4-FFF2-40B4-BE49-F238E27FC236}">
+                <a16:creationId xmlns:a16="http://schemas.microsoft.com/office/drawing/2014/main" id="{18A7D50F-6D3D-4EDD-9C86-F669471689C2}"/>
+              </a:ext>
+            </a:extLst>
+          </p:cNvPr>
+          <p:cNvCxnSpPr>
+            <a:stCxn id="52" idx="1"/>
+            <a:endCxn id="6" idx="3"/>
+          </p:cNvCxnSpPr>
+          <p:nvPr/>
+        </p:nvCxnSpPr>
+        <p:spPr>
+          <a:xfrm flipH="1">
+            <a:off x="2552700" y="2343150"/>
+            <a:ext cx="228600" cy="0"/>
+          </a:xfrm>
+          <a:prstGeom prst="straightConnector1">
+            <a:avLst/>
+          </a:prstGeom>
+          <a:ln>
+            <a:prstDash val="lgDash"/>
+            <a:tailEnd type="triangle"/>
+          </a:ln>
+        </p:spPr>
+        <p:style>
+          <a:lnRef idx="1">
+            <a:schemeClr val="accent1"/>
+          </a:lnRef>
+          <a:fillRef idx="0">
+            <a:schemeClr val="accent1"/>
+          </a:fillRef>
+          <a:effectRef idx="0">
+            <a:schemeClr val="accent1"/>
+          </a:effectRef>
+          <a:fontRef idx="minor">
+            <a:schemeClr val="tx1"/>
+          </a:fontRef>
+        </p:style>
+      </p:cxnSp>
+      <p:cxnSp>
+        <p:nvCxnSpPr>
+          <p:cNvPr id="153" name="Straight Arrow Connector 152">
+            <a:extLst>
+              <a:ext uri="{FF2B5EF4-FFF2-40B4-BE49-F238E27FC236}">
+                <a16:creationId xmlns:a16="http://schemas.microsoft.com/office/drawing/2014/main" id="{33D0FA47-4165-469C-B3D9-593793AAEC98}"/>
+              </a:ext>
+            </a:extLst>
+          </p:cNvPr>
+          <p:cNvCxnSpPr>
+            <a:cxnSpLocks/>
+            <a:stCxn id="45" idx="3"/>
+            <a:endCxn id="138" idx="1"/>
+          </p:cNvCxnSpPr>
+          <p:nvPr/>
+        </p:nvCxnSpPr>
+        <p:spPr>
+          <a:xfrm>
+            <a:off x="8267700" y="3143250"/>
+            <a:ext cx="228600" cy="0"/>
+          </a:xfrm>
+          <a:prstGeom prst="straightConnector1">
+            <a:avLst/>
+          </a:prstGeom>
+          <a:ln>
+            <a:prstDash val="lgDash"/>
             <a:tailEnd type="triangle"/>
           </a:ln>
         </p:spPr>

</xml_diff>

<commit_message>
08/01 batch of image syntax updates (#3007)
* wip

* WIP

* Update bot-builder-compositcontrol.md

* Update bot-builder-compositcontrol.md

* wip

* Update bot-builder-concept-middleware.md

* wip

* Update bot-builder-concept-state.md

* Update bot-builder-concept-waterfall-dialogs.md

* Update bot-builder-concept-waterfall-dialogs.md

* Apply suggestions from code review

Co-authored-by: Alex Larioza <94562440+v-alarioza@users.noreply.github.com>

* Apply suggestions from code review

Co-authored-by: Alex Larioza <94562440+v-alarioza@users.noreply.github.com>

* Update bot-builder-compositcontrol.md

Co-authored-by: Alex Larioza <94562440+v-alarioza@users.noreply.github.com>
</commit_message>
<xml_diff>
--- a/art-source/power-point/bot-concepts-art.pptx
+++ b/art-source/power-point/bot-concepts-art.pptx
@@ -118,6 +118,32 @@
     </a:lvl9pPr>
   </p:defaultTextStyle>
   <p:extLst>
+    <p:ext uri="{521415D9-36F7-43E2-AB2F-B90AF26B5E84}">
+      <p14:sectionLst xmlns:p14="http://schemas.microsoft.com/office/powerpoint/2010/main">
+        <p14:section name="Default Section" id="{A86FFD13-3FA3-4D48-9511-EE08FAC2CB0E}">
+          <p14:sldIdLst>
+            <p14:sldId id="272"/>
+          </p14:sldIdLst>
+        </p14:section>
+        <p14:section name="v4sdk\media\bot-builder-activity-processing-stack" id="{0A8D9C76-91C2-48C1-8102-B2ADE974CFD3}">
+          <p14:sldIdLst>
+            <p14:sldId id="269"/>
+            <p14:sldId id="270"/>
+            <p14:sldId id="274"/>
+            <p14:sldId id="271"/>
+            <p14:sldId id="264"/>
+            <p14:sldId id="268"/>
+            <p14:sldId id="266"/>
+            <p14:sldId id="267"/>
+            <p14:sldId id="276"/>
+            <p14:sldId id="275"/>
+            <p14:sldId id="277"/>
+            <p14:sldId id="280"/>
+            <p14:sldId id="279"/>
+          </p14:sldIdLst>
+        </p14:section>
+      </p14:sectionLst>
+    </p:ext>
     <p:ext uri="{EFAFB233-063F-42B5-8137-9DF3F51BA10A}">
       <p15:sldGuideLst xmlns:p15="http://schemas.microsoft.com/office/powerpoint/2012/main"/>
     </p:ext>
@@ -272,7 +298,7 @@
           <a:p>
             <a:fld id="{D5D811E7-D537-4010-8288-CC65B28B2855}" type="datetimeFigureOut">
               <a:rPr lang="en-US" smtClean="0"/>
-              <a:t>5/14/2020</a:t>
+              <a:t>8/1/2022</a:t>
             </a:fld>
             <a:endParaRPr lang="en-US"/>
           </a:p>
@@ -470,7 +496,7 @@
           <a:p>
             <a:fld id="{D5D811E7-D537-4010-8288-CC65B28B2855}" type="datetimeFigureOut">
               <a:rPr lang="en-US" smtClean="0"/>
-              <a:t>5/14/2020</a:t>
+              <a:t>8/1/2022</a:t>
             </a:fld>
             <a:endParaRPr lang="en-US"/>
           </a:p>
@@ -678,7 +704,7 @@
           <a:p>
             <a:fld id="{D5D811E7-D537-4010-8288-CC65B28B2855}" type="datetimeFigureOut">
               <a:rPr lang="en-US" smtClean="0"/>
-              <a:t>5/14/2020</a:t>
+              <a:t>8/1/2022</a:t>
             </a:fld>
             <a:endParaRPr lang="en-US"/>
           </a:p>
@@ -876,7 +902,7 @@
           <a:p>
             <a:fld id="{D5D811E7-D537-4010-8288-CC65B28B2855}" type="datetimeFigureOut">
               <a:rPr lang="en-US" smtClean="0"/>
-              <a:t>5/14/2020</a:t>
+              <a:t>8/1/2022</a:t>
             </a:fld>
             <a:endParaRPr lang="en-US"/>
           </a:p>
@@ -1151,7 +1177,7 @@
           <a:p>
             <a:fld id="{D5D811E7-D537-4010-8288-CC65B28B2855}" type="datetimeFigureOut">
               <a:rPr lang="en-US" smtClean="0"/>
-              <a:t>5/14/2020</a:t>
+              <a:t>8/1/2022</a:t>
             </a:fld>
             <a:endParaRPr lang="en-US"/>
           </a:p>
@@ -1416,7 +1442,7 @@
           <a:p>
             <a:fld id="{D5D811E7-D537-4010-8288-CC65B28B2855}" type="datetimeFigureOut">
               <a:rPr lang="en-US" smtClean="0"/>
-              <a:t>5/14/2020</a:t>
+              <a:t>8/1/2022</a:t>
             </a:fld>
             <a:endParaRPr lang="en-US"/>
           </a:p>
@@ -1828,7 +1854,7 @@
           <a:p>
             <a:fld id="{D5D811E7-D537-4010-8288-CC65B28B2855}" type="datetimeFigureOut">
               <a:rPr lang="en-US" smtClean="0"/>
-              <a:t>5/14/2020</a:t>
+              <a:t>8/1/2022</a:t>
             </a:fld>
             <a:endParaRPr lang="en-US"/>
           </a:p>
@@ -1969,7 +1995,7 @@
           <a:p>
             <a:fld id="{D5D811E7-D537-4010-8288-CC65B28B2855}" type="datetimeFigureOut">
               <a:rPr lang="en-US" smtClean="0"/>
-              <a:t>5/14/2020</a:t>
+              <a:t>8/1/2022</a:t>
             </a:fld>
             <a:endParaRPr lang="en-US"/>
           </a:p>
@@ -2082,7 +2108,7 @@
           <a:p>
             <a:fld id="{D5D811E7-D537-4010-8288-CC65B28B2855}" type="datetimeFigureOut">
               <a:rPr lang="en-US" smtClean="0"/>
-              <a:t>5/14/2020</a:t>
+              <a:t>8/1/2022</a:t>
             </a:fld>
             <a:endParaRPr lang="en-US"/>
           </a:p>
@@ -2393,7 +2419,7 @@
           <a:p>
             <a:fld id="{D5D811E7-D537-4010-8288-CC65B28B2855}" type="datetimeFigureOut">
               <a:rPr lang="en-US" smtClean="0"/>
-              <a:t>5/14/2020</a:t>
+              <a:t>8/1/2022</a:t>
             </a:fld>
             <a:endParaRPr lang="en-US"/>
           </a:p>
@@ -2681,7 +2707,7 @@
           <a:p>
             <a:fld id="{D5D811E7-D537-4010-8288-CC65B28B2855}" type="datetimeFigureOut">
               <a:rPr lang="en-US" smtClean="0"/>
-              <a:t>5/14/2020</a:t>
+              <a:t>8/1/2022</a:t>
             </a:fld>
             <a:endParaRPr lang="en-US"/>
           </a:p>
@@ -2922,7 +2948,7 @@
           <a:p>
             <a:fld id="{D5D811E7-D537-4010-8288-CC65B28B2855}" type="datetimeFigureOut">
               <a:rPr lang="en-US" smtClean="0"/>
-              <a:t>5/14/2020</a:t>
+              <a:t>8/1/2022</a:t>
             </a:fld>
             <a:endParaRPr lang="en-US"/>
           </a:p>
@@ -3537,7 +3563,7 @@
                   <a:srgbClr val="0070C0"/>
                 </a:solidFill>
               </a:rPr>
-              <a:t>Bot Framework Service</a:t>
+              <a:t>Azure Bot Service</a:t>
             </a:r>
           </a:p>
         </p:txBody>
@@ -4957,12 +4983,20 @@
             <a:p>
               <a:pPr algn="ctr"/>
               <a:r>
+                <a:rPr lang="en-US">
+                  <a:solidFill>
+                    <a:srgbClr val="0070C0"/>
+                  </a:solidFill>
+                </a:rPr>
+                <a:t>Azure Bot </a:t>
+              </a:r>
+              <a:r>
                 <a:rPr lang="en-US" dirty="0">
                   <a:solidFill>
                     <a:srgbClr val="0070C0"/>
                   </a:solidFill>
                 </a:rPr>
-                <a:t>Bot Framework Service</a:t>
+                <a:t>Service</a:t>
               </a:r>
             </a:p>
           </p:txBody>
@@ -13410,7 +13444,7 @@
                     <a:srgbClr val="0070C0"/>
                   </a:solidFill>
                 </a:rPr>
-                <a:t>Bot Framework Service</a:t>
+                <a:t>Azure Bot Service</a:t>
               </a:r>
             </a:p>
           </p:txBody>
@@ -13743,9 +13777,7 @@
             </a:prstGeom>
             <a:noFill/>
             <a:ln>
-              <a:solidFill>
-                <a:schemeClr val="accent1"/>
-              </a:solidFill>
+              <a:noFill/>
             </a:ln>
           </p:spPr>
           <p:txBody>
@@ -23063,4 +23095,10 @@
     </a:ext>
   </a:extLst>
 </a:theme>
+</file>
+
+<file path=docMetadata/LabelInfo.xml><?xml version="1.0" encoding="utf-8"?>
+<clbl:labelList xmlns:clbl="http://schemas.microsoft.com/office/2020/mipLabelMetadata">
+  <clbl:label id="{f42aa342-8706-4288-bd11-ebb85995028c}" enabled="1" method="Privileged" siteId="{72f988bf-86f1-41af-91ab-2d7cd011db47}" removed="0"/>
+</clbl:labelList>
 </file>
</xml_diff>